<commit_message>
add unit test & modify explain document.
</commit_message>
<xml_diff>
--- a/file/AOP_介紹PPT.pptx
+++ b/file/AOP_介紹PPT.pptx
@@ -11,8 +11,8 @@
     <p:sldId id="256" r:id="rId2"/>
     <p:sldId id="257" r:id="rId3"/>
     <p:sldId id="266" r:id="rId4"/>
-    <p:sldId id="259" r:id="rId5"/>
-    <p:sldId id="269" r:id="rId6"/>
+    <p:sldId id="269" r:id="rId5"/>
+    <p:sldId id="259" r:id="rId6"/>
     <p:sldId id="262" r:id="rId7"/>
     <p:sldId id="267" r:id="rId8"/>
     <p:sldId id="268" r:id="rId9"/>
@@ -205,7 +205,7 @@
             <a:fld id="{F3155D81-3271-4795-A293-25DEAA7F9BDF}" type="datetimeFigureOut">
               <a:rPr lang="zh-TW" altLang="en-US" smtClean="0"/>
               <a:pPr/>
-              <a:t>2018/2/5</a:t>
+              <a:t>2018/4/26</a:t>
             </a:fld>
             <a:endParaRPr lang="zh-TW" altLang="en-US"/>
           </a:p>
@@ -567,7 +567,7 @@
             <a:fld id="{73C1EC46-FADC-4261-80CF-DD94525400E6}" type="slidenum">
               <a:rPr lang="zh-TW" altLang="en-US" smtClean="0"/>
               <a:pPr/>
-              <a:t>4</a:t>
+              <a:t>5</a:t>
             </a:fld>
             <a:endParaRPr lang="zh-TW" altLang="en-US"/>
           </a:p>
@@ -1685,7 +1685,7 @@
             <a:fld id="{5BBEAD13-0566-4C6C-97E7-55F17F24B09F}" type="datetimeFigureOut">
               <a:rPr lang="zh-TW" altLang="en-US" smtClean="0"/>
               <a:pPr/>
-              <a:t>2018/2/5</a:t>
+              <a:t>2018/4/26</a:t>
             </a:fld>
             <a:endParaRPr lang="zh-TW" altLang="en-US"/>
           </a:p>
@@ -1852,7 +1852,7 @@
             <a:fld id="{5BBEAD13-0566-4C6C-97E7-55F17F24B09F}" type="datetimeFigureOut">
               <a:rPr lang="zh-TW" altLang="en-US" smtClean="0"/>
               <a:pPr/>
-              <a:t>2018/2/5</a:t>
+              <a:t>2018/4/26</a:t>
             </a:fld>
             <a:endParaRPr lang="zh-TW" altLang="en-US"/>
           </a:p>
@@ -2029,7 +2029,7 @@
             <a:fld id="{5BBEAD13-0566-4C6C-97E7-55F17F24B09F}" type="datetimeFigureOut">
               <a:rPr lang="zh-TW" altLang="en-US" smtClean="0"/>
               <a:pPr/>
-              <a:t>2018/2/5</a:t>
+              <a:t>2018/4/26</a:t>
             </a:fld>
             <a:endParaRPr lang="zh-TW" altLang="en-US"/>
           </a:p>
@@ -2196,7 +2196,7 @@
             <a:fld id="{5BBEAD13-0566-4C6C-97E7-55F17F24B09F}" type="datetimeFigureOut">
               <a:rPr lang="zh-TW" altLang="en-US" smtClean="0"/>
               <a:pPr/>
-              <a:t>2018/2/5</a:t>
+              <a:t>2018/4/26</a:t>
             </a:fld>
             <a:endParaRPr lang="zh-TW" altLang="en-US"/>
           </a:p>
@@ -2439,7 +2439,7 @@
             <a:fld id="{5BBEAD13-0566-4C6C-97E7-55F17F24B09F}" type="datetimeFigureOut">
               <a:rPr lang="zh-TW" altLang="en-US" smtClean="0"/>
               <a:pPr/>
-              <a:t>2018/2/5</a:t>
+              <a:t>2018/4/26</a:t>
             </a:fld>
             <a:endParaRPr lang="zh-TW" altLang="en-US"/>
           </a:p>
@@ -2724,7 +2724,7 @@
             <a:fld id="{5BBEAD13-0566-4C6C-97E7-55F17F24B09F}" type="datetimeFigureOut">
               <a:rPr lang="zh-TW" altLang="en-US" smtClean="0"/>
               <a:pPr/>
-              <a:t>2018/2/5</a:t>
+              <a:t>2018/4/26</a:t>
             </a:fld>
             <a:endParaRPr lang="zh-TW" altLang="en-US"/>
           </a:p>
@@ -3143,7 +3143,7 @@
             <a:fld id="{5BBEAD13-0566-4C6C-97E7-55F17F24B09F}" type="datetimeFigureOut">
               <a:rPr lang="zh-TW" altLang="en-US" smtClean="0"/>
               <a:pPr/>
-              <a:t>2018/2/5</a:t>
+              <a:t>2018/4/26</a:t>
             </a:fld>
             <a:endParaRPr lang="zh-TW" altLang="en-US"/>
           </a:p>
@@ -3258,7 +3258,7 @@
             <a:fld id="{5BBEAD13-0566-4C6C-97E7-55F17F24B09F}" type="datetimeFigureOut">
               <a:rPr lang="zh-TW" altLang="en-US" smtClean="0"/>
               <a:pPr/>
-              <a:t>2018/2/5</a:t>
+              <a:t>2018/4/26</a:t>
             </a:fld>
             <a:endParaRPr lang="zh-TW" altLang="en-US"/>
           </a:p>
@@ -3350,7 +3350,7 @@
             <a:fld id="{5BBEAD13-0566-4C6C-97E7-55F17F24B09F}" type="datetimeFigureOut">
               <a:rPr lang="zh-TW" altLang="en-US" smtClean="0"/>
               <a:pPr/>
-              <a:t>2018/2/5</a:t>
+              <a:t>2018/4/26</a:t>
             </a:fld>
             <a:endParaRPr lang="zh-TW" altLang="en-US"/>
           </a:p>
@@ -3624,7 +3624,7 @@
             <a:fld id="{5BBEAD13-0566-4C6C-97E7-55F17F24B09F}" type="datetimeFigureOut">
               <a:rPr lang="zh-TW" altLang="en-US" smtClean="0"/>
               <a:pPr/>
-              <a:t>2018/2/5</a:t>
+              <a:t>2018/4/26</a:t>
             </a:fld>
             <a:endParaRPr lang="zh-TW" altLang="en-US"/>
           </a:p>
@@ -3874,7 +3874,7 @@
             <a:fld id="{5BBEAD13-0566-4C6C-97E7-55F17F24B09F}" type="datetimeFigureOut">
               <a:rPr lang="zh-TW" altLang="en-US" smtClean="0"/>
               <a:pPr/>
-              <a:t>2018/2/5</a:t>
+              <a:t>2018/4/26</a:t>
             </a:fld>
             <a:endParaRPr lang="zh-TW" altLang="en-US"/>
           </a:p>
@@ -4084,7 +4084,7 @@
             <a:fld id="{5BBEAD13-0566-4C6C-97E7-55F17F24B09F}" type="datetimeFigureOut">
               <a:rPr lang="zh-TW" altLang="en-US" smtClean="0"/>
               <a:pPr/>
-              <a:t>2018/2/5</a:t>
+              <a:t>2018/4/26</a:t>
             </a:fld>
             <a:endParaRPr lang="zh-TW" altLang="en-US"/>
           </a:p>
@@ -5263,13 +5263,7 @@
               <a:rPr lang="en-US" altLang="zh-TW" sz="2000" dirty="0" smtClean="0">
                 <a:hlinkClick r:id="rId6"/>
               </a:rPr>
-              <a:t>https://</a:t>
-            </a:r>
-            <a:r>
-              <a:rPr lang="en-US" altLang="zh-TW" sz="2000" dirty="0" smtClean="0">
-                <a:hlinkClick r:id="rId6"/>
-              </a:rPr>
-              <a:t>github.com/isdaniel/AwesomeProxy.Net</a:t>
+              <a:t>https://github.com/isdaniel/AwesomeProxy.Net</a:t>
             </a:r>
             <a:endParaRPr lang="en-US" altLang="zh-TW" sz="2000" dirty="0" smtClean="0"/>
           </a:p>
@@ -5694,87 +5688,167 @@
           <a:bodyPr/>
           <a:lstStyle/>
           <a:p>
+            <a:endParaRPr lang="zh-TW" altLang="en-US" dirty="0"/>
+          </a:p>
+        </p:txBody>
+      </p:sp>
+      <p:sp>
+        <p:nvSpPr>
+          <p:cNvPr id="3" name="內容版面配置區 2"/>
+          <p:cNvSpPr>
+            <a:spLocks noGrp="1"/>
+          </p:cNvSpPr>
+          <p:nvPr>
+            <p:ph idx="1"/>
+          </p:nvPr>
+        </p:nvSpPr>
+        <p:spPr/>
+        <p:txBody>
+          <a:bodyPr>
+            <a:normAutofit fontScale="92500" lnSpcReduction="10000"/>
+          </a:bodyPr>
+          <a:lstStyle/>
+          <a:p>
             <a:r>
               <a:rPr lang="zh-TW" altLang="en-US" dirty="0" smtClean="0"/>
-              <a:t>代理模式</a:t>
+              <a:t>小明是一個歌唱明星</a:t>
             </a:r>
             <a:r>
               <a:rPr lang="en-US" altLang="zh-TW" dirty="0" smtClean="0"/>
-              <a:t>UML</a:t>
+              <a:t>,</a:t>
             </a:r>
             <a:r>
               <a:rPr lang="zh-TW" altLang="en-US" dirty="0" smtClean="0"/>
-              <a:t>圖</a:t>
-            </a:r>
-            <a:endParaRPr lang="zh-TW" altLang="en-US" dirty="0"/>
-          </a:p>
-        </p:txBody>
-      </p:sp>
-      <p:sp>
-        <p:nvSpPr>
-          <p:cNvPr id="3" name="內容版面配置區 2"/>
-          <p:cNvSpPr>
-            <a:spLocks noGrp="1"/>
-          </p:cNvSpPr>
-          <p:nvPr>
-            <p:ph idx="1"/>
-          </p:nvPr>
-        </p:nvSpPr>
-        <p:spPr/>
-        <p:txBody>
-          <a:bodyPr>
-            <a:normAutofit/>
-          </a:bodyPr>
-          <a:lstStyle/>
-          <a:p>
+              <a:t>他有個代理人如果要唱歌需要先和代理人告知</a:t>
+            </a:r>
+            <a:r>
+              <a:rPr lang="en-US" altLang="zh-TW" dirty="0" smtClean="0"/>
+              <a:t>,</a:t>
+            </a:r>
+            <a:r>
+              <a:rPr lang="zh-TW" altLang="en-US" dirty="0" smtClean="0"/>
+              <a:t>代理人在跟小明說</a:t>
+            </a:r>
             <a:endParaRPr lang="en-US" altLang="zh-TW" dirty="0" smtClean="0"/>
           </a:p>
           <a:p>
+            <a:r>
+              <a:rPr lang="zh-TW" altLang="en-US" dirty="0" smtClean="0"/>
+              <a:t>代理人 </a:t>
+            </a:r>
+            <a:r>
+              <a:rPr lang="en-US" altLang="zh-TW" dirty="0" smtClean="0"/>
+              <a:t>=</a:t>
+            </a:r>
+            <a:r>
+              <a:rPr lang="zh-TW" altLang="en-US" dirty="0" smtClean="0"/>
+              <a:t> 小明形象</a:t>
+            </a:r>
             <a:endParaRPr lang="en-US" altLang="zh-TW" dirty="0" smtClean="0"/>
           </a:p>
           <a:p>
+            <a:pPr>
+              <a:buNone/>
+            </a:pPr>
+            <a:r>
+              <a:rPr lang="zh-TW" altLang="en-US" dirty="0" smtClean="0"/>
+              <a:t>     </a:t>
+            </a:r>
+            <a:r>
+              <a:rPr lang="en-US" altLang="zh-TW" dirty="0" smtClean="0"/>
+              <a:t>1.</a:t>
+            </a:r>
+            <a:r>
+              <a:rPr lang="zh-TW" altLang="en-US" dirty="0" smtClean="0"/>
+              <a:t> 代理人幫你記錄演唱行程</a:t>
+            </a:r>
             <a:endParaRPr lang="en-US" altLang="zh-TW" dirty="0" smtClean="0"/>
           </a:p>
           <a:p>
+            <a:pPr>
+              <a:buNone/>
+            </a:pPr>
+            <a:r>
+              <a:rPr lang="zh-TW" altLang="en-US" dirty="0" smtClean="0"/>
+              <a:t>     </a:t>
+            </a:r>
+            <a:r>
+              <a:rPr lang="en-US" altLang="zh-TW" dirty="0" smtClean="0"/>
+              <a:t>2.</a:t>
+            </a:r>
+            <a:r>
+              <a:rPr lang="zh-TW" altLang="en-US" dirty="0" smtClean="0"/>
+              <a:t> </a:t>
+            </a:r>
+            <a:r>
+              <a:rPr lang="zh-TW" altLang="en-US" dirty="0" smtClean="0"/>
+              <a:t>代理人跟廠商收取介紹費</a:t>
+            </a:r>
+            <a:r>
+              <a:rPr lang="en-US" altLang="zh-TW" dirty="0" smtClean="0"/>
+              <a:t>..</a:t>
+            </a:r>
+            <a:r>
+              <a:rPr lang="zh-TW" altLang="en-US" dirty="0" smtClean="0"/>
+              <a:t>誤</a:t>
+            </a:r>
+            <a:r>
+              <a:rPr lang="en-US" altLang="zh-TW" dirty="0" smtClean="0"/>
+              <a:t>XD</a:t>
+            </a:r>
             <a:endParaRPr lang="en-US" altLang="zh-TW" dirty="0" smtClean="0"/>
           </a:p>
           <a:p>
+            <a:pPr>
+              <a:buNone/>
+            </a:pPr>
+            <a:r>
+              <a:rPr lang="zh-TW" altLang="en-US" sz="2800" dirty="0" smtClean="0"/>
+              <a:t>      </a:t>
+            </a:r>
+            <a:r>
+              <a:rPr lang="en-US" altLang="zh-TW" sz="2800" dirty="0" smtClean="0"/>
+              <a:t>3.</a:t>
+            </a:r>
+            <a:r>
+              <a:rPr lang="zh-TW" altLang="en-US" sz="2800" dirty="0" smtClean="0"/>
+              <a:t> 其他事情</a:t>
+            </a:r>
+            <a:r>
+              <a:rPr lang="en-US" altLang="zh-TW" sz="2800" dirty="0" smtClean="0"/>
+              <a:t>…..</a:t>
+            </a:r>
+          </a:p>
+          <a:p>
+            <a:pPr>
+              <a:buNone/>
+            </a:pPr>
+            <a:endParaRPr lang="en-US" altLang="zh-TW" sz="2800" dirty="0" smtClean="0"/>
+          </a:p>
+          <a:p>
+            <a:pPr>
+              <a:buNone/>
+            </a:pPr>
+            <a:r>
+              <a:rPr lang="zh-TW" altLang="en-US" dirty="0" smtClean="0"/>
+              <a:t>代理人可讓小明可以安心唱歌就</a:t>
+            </a:r>
+            <a:r>
+              <a:rPr lang="zh-TW" altLang="en-US" smtClean="0"/>
+              <a:t>好，日後</a:t>
+            </a:r>
+            <a:r>
+              <a:rPr lang="zh-TW" altLang="en-US" dirty="0" smtClean="0"/>
+              <a:t>有其他問題或事情交由代理人</a:t>
+            </a:r>
+            <a:r>
+              <a:rPr lang="zh-TW" altLang="en-US" smtClean="0"/>
+              <a:t>來處理。</a:t>
+            </a:r>
             <a:endParaRPr lang="en-US" altLang="zh-TW" dirty="0" smtClean="0"/>
           </a:p>
-          <a:p>
-            <a:pPr>
-              <a:buNone/>
-            </a:pPr>
-            <a:endParaRPr lang="en-US" altLang="zh-TW" dirty="0" smtClean="0"/>
-          </a:p>
-        </p:txBody>
-      </p:sp>
-      <p:pic>
-        <p:nvPicPr>
-          <p:cNvPr id="8" name="Picture 2" descr="C:\Users\daniel.shih\Desktop\Aop\439px-Proxy_pattern_diagram.svg.png"/>
-          <p:cNvPicPr>
-            <a:picLocks noChangeAspect="1" noChangeArrowheads="1"/>
-          </p:cNvPicPr>
-          <p:nvPr/>
-        </p:nvPicPr>
-        <p:blipFill>
-          <a:blip r:embed="rId3" cstate="print"/>
-          <a:srcRect/>
-          <a:stretch>
-            <a:fillRect/>
-          </a:stretch>
-        </p:blipFill>
-        <p:spPr bwMode="auto">
-          <a:xfrm>
-            <a:off x="1115616" y="1772816"/>
-            <a:ext cx="6838409" cy="3816424"/>
-          </a:xfrm>
-          <a:prstGeom prst="rect">
-            <a:avLst/>
-          </a:prstGeom>
-          <a:noFill/>
-        </p:spPr>
-      </p:pic>
+        </p:txBody>
+      </p:sp>
     </p:spTree>
   </p:cSld>
   <p:clrMapOvr>
@@ -5822,6 +5896,18 @@
           <a:bodyPr/>
           <a:lstStyle/>
           <a:p>
+            <a:r>
+              <a:rPr lang="zh-TW" altLang="en-US" dirty="0" smtClean="0"/>
+              <a:t>代理模式</a:t>
+            </a:r>
+            <a:r>
+              <a:rPr lang="en-US" altLang="zh-TW" dirty="0" smtClean="0"/>
+              <a:t>UML</a:t>
+            </a:r>
+            <a:r>
+              <a:rPr lang="zh-TW" altLang="en-US" dirty="0" smtClean="0"/>
+              <a:t>圖</a:t>
+            </a:r>
             <a:endParaRPr lang="zh-TW" altLang="en-US" dirty="0"/>
           </a:p>
         </p:txBody>
@@ -5838,107 +5924,59 @@
         </p:nvSpPr>
         <p:spPr/>
         <p:txBody>
-          <a:bodyPr/>
-          <a:lstStyle/>
-          <a:p>
-            <a:r>
-              <a:rPr lang="zh-TW" altLang="en-US" dirty="0" smtClean="0"/>
-              <a:t>有一天你請小明幫你買東西，</a:t>
-            </a:r>
+          <a:bodyPr>
+            <a:normAutofit/>
+          </a:bodyPr>
+          <a:lstStyle/>
+          <a:p>
             <a:endParaRPr lang="en-US" altLang="zh-TW" dirty="0" smtClean="0"/>
           </a:p>
           <a:p>
-            <a:r>
-              <a:rPr lang="zh-TW" altLang="en-US" dirty="0" smtClean="0"/>
-              <a:t>小明在買東西途中</a:t>
-            </a:r>
             <a:endParaRPr lang="en-US" altLang="zh-TW" dirty="0" smtClean="0"/>
           </a:p>
           <a:p>
+            <a:endParaRPr lang="en-US" altLang="zh-TW" dirty="0" smtClean="0"/>
+          </a:p>
+          <a:p>
+            <a:endParaRPr lang="en-US" altLang="zh-TW" dirty="0" smtClean="0"/>
+          </a:p>
+          <a:p>
+            <a:endParaRPr lang="en-US" altLang="zh-TW" dirty="0" smtClean="0"/>
+          </a:p>
+          <a:p>
             <a:pPr>
               <a:buNone/>
             </a:pPr>
-            <a:r>
-              <a:rPr lang="zh-TW" altLang="en-US" dirty="0" smtClean="0"/>
-              <a:t>     </a:t>
-            </a:r>
-            <a:r>
-              <a:rPr lang="en-US" altLang="zh-TW" dirty="0" smtClean="0"/>
-              <a:t>1.</a:t>
-            </a:r>
-            <a:r>
-              <a:rPr lang="zh-TW" altLang="en-US" dirty="0" smtClean="0"/>
-              <a:t> 幫你檢查前有沒有帶夠 </a:t>
-            </a:r>
             <a:endParaRPr lang="en-US" altLang="zh-TW" dirty="0" smtClean="0"/>
           </a:p>
-          <a:p>
-            <a:pPr>
-              <a:buNone/>
-            </a:pPr>
-            <a:r>
-              <a:rPr lang="zh-TW" altLang="en-US" dirty="0" smtClean="0"/>
-              <a:t>     </a:t>
-            </a:r>
-            <a:r>
-              <a:rPr lang="en-US" altLang="zh-TW" dirty="0" smtClean="0"/>
-              <a:t>2.</a:t>
-            </a:r>
-            <a:r>
-              <a:rPr lang="zh-TW" altLang="en-US" dirty="0" smtClean="0"/>
-              <a:t> 幫你寄帳。</a:t>
-            </a:r>
-            <a:endParaRPr lang="en-US" altLang="zh-TW" dirty="0" smtClean="0"/>
-          </a:p>
-          <a:p>
-            <a:pPr>
-              <a:buNone/>
-            </a:pPr>
-            <a:endParaRPr lang="en-US" altLang="zh-TW" sz="2800" dirty="0" smtClean="0"/>
-          </a:p>
-          <a:p>
-            <a:pPr>
-              <a:buNone/>
-            </a:pPr>
-            <a:r>
-              <a:rPr lang="zh-TW" altLang="en-US" sz="2800" dirty="0" smtClean="0"/>
-              <a:t>我知道  </a:t>
-            </a:r>
-            <a:r>
-              <a:rPr lang="en-US" altLang="zh-TW" sz="2800" dirty="0" smtClean="0"/>
-              <a:t>1</a:t>
-            </a:r>
-            <a:r>
-              <a:rPr lang="zh-TW" altLang="en-US" sz="2800" dirty="0" smtClean="0"/>
-              <a:t> 和 </a:t>
-            </a:r>
-            <a:r>
-              <a:rPr lang="en-US" altLang="zh-TW" sz="2800" dirty="0" smtClean="0"/>
-              <a:t>2</a:t>
-            </a:r>
-            <a:r>
-              <a:rPr lang="zh-TW" altLang="en-US" sz="2800" dirty="0" smtClean="0"/>
-              <a:t> 跟買東西沒有相關 我不需要知道，所以這是一個</a:t>
-            </a:r>
-            <a:r>
-              <a:rPr lang="zh-TW" altLang="en-US" sz="2800" dirty="0" smtClean="0">
-                <a:solidFill>
-                  <a:srgbClr val="FF0000"/>
-                </a:solidFill>
-              </a:rPr>
-              <a:t>解偶點</a:t>
-            </a:r>
-            <a:endParaRPr lang="en-US" altLang="zh-TW" sz="2800" dirty="0" smtClean="0">
-              <a:solidFill>
-                <a:srgbClr val="FF0000"/>
-              </a:solidFill>
-            </a:endParaRPr>
-          </a:p>
-          <a:p>
-            <a:endParaRPr lang="en-US" altLang="zh-TW" dirty="0" smtClean="0"/>
-          </a:p>
-        </p:txBody>
-      </p:sp>
+        </p:txBody>
+      </p:sp>
+      <p:pic>
+        <p:nvPicPr>
+          <p:cNvPr id="8" name="Picture 2" descr="C:\Users\daniel.shih\Desktop\Aop\439px-Proxy_pattern_diagram.svg.png"/>
+          <p:cNvPicPr>
+            <a:picLocks noChangeAspect="1" noChangeArrowheads="1"/>
+          </p:cNvPicPr>
+          <p:nvPr/>
+        </p:nvPicPr>
+        <p:blipFill>
+          <a:blip r:embed="rId3" cstate="print"/>
+          <a:srcRect/>
+          <a:stretch>
+            <a:fillRect/>
+          </a:stretch>
+        </p:blipFill>
+        <p:spPr bwMode="auto">
+          <a:xfrm>
+            <a:off x="1115616" y="1772816"/>
+            <a:ext cx="6838409" cy="3816424"/>
+          </a:xfrm>
+          <a:prstGeom prst="rect">
+            <a:avLst/>
+          </a:prstGeom>
+          <a:noFill/>
+        </p:spPr>
+      </p:pic>
     </p:spTree>
   </p:cSld>
   <p:clrMapOvr>
@@ -6459,15 +6497,7 @@
             </a:r>
             <a:r>
               <a:rPr lang="en-US" altLang="zh-TW" dirty="0" smtClean="0"/>
-              <a:t> </a:t>
-            </a:r>
-            <a:r>
-              <a:rPr lang="en-US" altLang="zh-TW" dirty="0" smtClean="0"/>
-              <a:t> </a:t>
-            </a:r>
-            <a:r>
-              <a:rPr lang="en-US" altLang="zh-TW" dirty="0" smtClean="0"/>
-              <a:t>How to used?</a:t>
+              <a:t>  How to used?</a:t>
             </a:r>
             <a:endParaRPr lang="zh-TW" altLang="en-US" dirty="0"/>
           </a:p>

</xml_diff>